<commit_message>
Update workshop files for Boeing use
</commit_message>
<xml_diff>
--- a/presentations/101 - Cloud Native Concepts/Session_1_CN_Design_DDD.pptx
+++ b/presentations/101 - Cloud Native Concepts/Session_1_CN_Design_DDD.pptx
@@ -4091,7 +4091,7 @@
           <a:p>
             <a:fld id="{372E5B6B-8713-8747-AE5B-F1241B2BF5F0}" type="datetimeFigureOut">
               <a:rPr lang="en-US" smtClean="0"/>
-              <a:t>10/12/17</a:t>
+              <a:t>9/7/17</a:t>
             </a:fld>
             <a:endParaRPr lang="en-US" dirty="0"/>
           </a:p>
@@ -4257,7 +4257,7 @@
           <a:p>
             <a:fld id="{7E7B7340-DDD5-1B49-81AA-25BC4050C073}" type="datetimeFigureOut">
               <a:rPr lang="en-US" smtClean="0"/>
-              <a:t>10/12/17</a:t>
+              <a:t>9/7/17</a:t>
             </a:fld>
             <a:endParaRPr lang="en-US" dirty="0"/>
           </a:p>
@@ -5139,7 +5139,15 @@
                   <a:schemeClr val="accent2"/>
                 </a:solidFill>
               </a:rPr>
-              <a:t>Figure 2.10  from Implementing Domain Driven Design</a:t>
+              <a:t>Figure 2.10  from Implementing Domain Driven </a:t>
+            </a:r>
+            <a:r>
+              <a:rPr lang="en-US" dirty="0" smtClean="0">
+                <a:solidFill>
+                  <a:schemeClr val="accent2"/>
+                </a:solidFill>
+              </a:rPr>
+              <a:t>Design</a:t>
             </a:r>
           </a:p>
           <a:p>
@@ -15145,6 +15153,30 @@
           </a:p>
         </p:txBody>
       </p:sp>
+      <p:pic>
+        <p:nvPicPr>
+          <p:cNvPr id="9" name="Picture 8"/>
+          <p:cNvPicPr>
+            <a:picLocks noChangeAspect="1"/>
+          </p:cNvPicPr>
+          <p:nvPr/>
+        </p:nvPicPr>
+        <p:blipFill>
+          <a:blip r:embed="rId5"/>
+          <a:stretch>
+            <a:fillRect/>
+          </a:stretch>
+        </p:blipFill>
+        <p:spPr>
+          <a:xfrm>
+            <a:off x="7261412" y="215642"/>
+            <a:ext cx="1652494" cy="435864"/>
+          </a:xfrm>
+          <a:prstGeom prst="rect">
+            <a:avLst/>
+          </a:prstGeom>
+        </p:spPr>
+      </p:pic>
     </p:spTree>
     <p:extLst>
       <p:ext uri="{BB962C8B-B14F-4D97-AF65-F5344CB8AC3E}">
@@ -16425,6 +16457,12 @@
               </a:rPr>
               <a:t>Aggregates</a:t>
             </a:r>
+            <a:endParaRPr lang="en-US" sz="2400" dirty="0" smtClean="0">
+              <a:solidFill>
+                <a:srgbClr val="FFFFFF"/>
+              </a:solidFill>
+              <a:sym typeface="Arial"/>
+            </a:endParaRPr>
           </a:p>
         </p:txBody>
       </p:sp>
@@ -16558,8 +16596,23 @@
                 </a:solidFill>
                 <a:sym typeface="Arial"/>
               </a:rPr>
-              <a:t>A map of the existing organization &amp; integration relationship between different bounded contexts</a:t>
-            </a:r>
+              <a:t>A map of the existing organization &amp; integration relationship between different bounded </a:t>
+            </a:r>
+            <a:r>
+              <a:rPr lang="en-US" sz="2000" dirty="0" smtClean="0">
+                <a:solidFill>
+                  <a:srgbClr val="FFFFFF"/>
+                </a:solidFill>
+                <a:sym typeface="Arial"/>
+              </a:rPr>
+              <a:t>contexts</a:t>
+            </a:r>
+            <a:endParaRPr lang="en-US" sz="2000" dirty="0" smtClean="0">
+              <a:solidFill>
+                <a:srgbClr val="FFFFFF"/>
+              </a:solidFill>
+              <a:sym typeface="Arial"/>
+            </a:endParaRPr>
           </a:p>
         </p:txBody>
       </p:sp>
@@ -17391,6 +17444,12 @@
               </a:rPr>
               <a:t>etect, determine and recover from failure</a:t>
             </a:r>
+            <a:endParaRPr lang="en-US" sz="2300" dirty="0" smtClean="0">
+              <a:solidFill>
+                <a:srgbClr val="FFFFFF"/>
+              </a:solidFill>
+              <a:sym typeface="Arial"/>
+            </a:endParaRPr>
           </a:p>
         </p:txBody>
       </p:sp>

</xml_diff>